<commit_message>
Developer Help - Improve Astronomical coordinates description
</commit_message>
<xml_diff>
--- a/Help/Developer Information/Astronomical Coordinates Pictures Master.pptx
+++ b/Help/Developer Information/Astronomical Coordinates Pictures Master.pptx
@@ -6,6 +6,7 @@
   </p:sldMasterIdLst>
   <p:sldIdLst>
     <p:sldId id="256" r:id="rId2"/>
+    <p:sldId id="257" r:id="rId3"/>
   </p:sldIdLst>
   <p:sldSz cx="12192000" cy="6858000"/>
   <p:notesSz cx="6858000" cy="9144000"/>
@@ -272,7 +273,7 @@
           <a:p>
             <a:fld id="{503C1F70-F31D-4D04-896A-1B84648E6D70}" type="datetimeFigureOut">
               <a:rPr lang="en-GB" smtClean="0"/>
-              <a:t>16/06/2018</a:t>
+              <a:t>03/07/2018</a:t>
             </a:fld>
             <a:endParaRPr lang="en-GB"/>
           </a:p>
@@ -472,7 +473,7 @@
           <a:p>
             <a:fld id="{503C1F70-F31D-4D04-896A-1B84648E6D70}" type="datetimeFigureOut">
               <a:rPr lang="en-GB" smtClean="0"/>
-              <a:t>16/06/2018</a:t>
+              <a:t>03/07/2018</a:t>
             </a:fld>
             <a:endParaRPr lang="en-GB"/>
           </a:p>
@@ -682,7 +683,7 @@
           <a:p>
             <a:fld id="{503C1F70-F31D-4D04-896A-1B84648E6D70}" type="datetimeFigureOut">
               <a:rPr lang="en-GB" smtClean="0"/>
-              <a:t>16/06/2018</a:t>
+              <a:t>03/07/2018</a:t>
             </a:fld>
             <a:endParaRPr lang="en-GB"/>
           </a:p>
@@ -882,7 +883,7 @@
           <a:p>
             <a:fld id="{503C1F70-F31D-4D04-896A-1B84648E6D70}" type="datetimeFigureOut">
               <a:rPr lang="en-GB" smtClean="0"/>
-              <a:t>16/06/2018</a:t>
+              <a:t>03/07/2018</a:t>
             </a:fld>
             <a:endParaRPr lang="en-GB"/>
           </a:p>
@@ -1158,7 +1159,7 @@
           <a:p>
             <a:fld id="{503C1F70-F31D-4D04-896A-1B84648E6D70}" type="datetimeFigureOut">
               <a:rPr lang="en-GB" smtClean="0"/>
-              <a:t>16/06/2018</a:t>
+              <a:t>03/07/2018</a:t>
             </a:fld>
             <a:endParaRPr lang="en-GB"/>
           </a:p>
@@ -1426,7 +1427,7 @@
           <a:p>
             <a:fld id="{503C1F70-F31D-4D04-896A-1B84648E6D70}" type="datetimeFigureOut">
               <a:rPr lang="en-GB" smtClean="0"/>
-              <a:t>16/06/2018</a:t>
+              <a:t>03/07/2018</a:t>
             </a:fld>
             <a:endParaRPr lang="en-GB"/>
           </a:p>
@@ -1841,7 +1842,7 @@
           <a:p>
             <a:fld id="{503C1F70-F31D-4D04-896A-1B84648E6D70}" type="datetimeFigureOut">
               <a:rPr lang="en-GB" smtClean="0"/>
-              <a:t>16/06/2018</a:t>
+              <a:t>03/07/2018</a:t>
             </a:fld>
             <a:endParaRPr lang="en-GB"/>
           </a:p>
@@ -1983,7 +1984,7 @@
           <a:p>
             <a:fld id="{503C1F70-F31D-4D04-896A-1B84648E6D70}" type="datetimeFigureOut">
               <a:rPr lang="en-GB" smtClean="0"/>
-              <a:t>16/06/2018</a:t>
+              <a:t>03/07/2018</a:t>
             </a:fld>
             <a:endParaRPr lang="en-GB"/>
           </a:p>
@@ -2096,7 +2097,7 @@
           <a:p>
             <a:fld id="{503C1F70-F31D-4D04-896A-1B84648E6D70}" type="datetimeFigureOut">
               <a:rPr lang="en-GB" smtClean="0"/>
-              <a:t>16/06/2018</a:t>
+              <a:t>03/07/2018</a:t>
             </a:fld>
             <a:endParaRPr lang="en-GB"/>
           </a:p>
@@ -2409,7 +2410,7 @@
           <a:p>
             <a:fld id="{503C1F70-F31D-4D04-896A-1B84648E6D70}" type="datetimeFigureOut">
               <a:rPr lang="en-GB" smtClean="0"/>
-              <a:t>16/06/2018</a:t>
+              <a:t>03/07/2018</a:t>
             </a:fld>
             <a:endParaRPr lang="en-GB"/>
           </a:p>
@@ -2698,7 +2699,7 @@
           <a:p>
             <a:fld id="{503C1F70-F31D-4D04-896A-1B84648E6D70}" type="datetimeFigureOut">
               <a:rPr lang="en-GB" smtClean="0"/>
-              <a:t>16/06/2018</a:t>
+              <a:t>03/07/2018</a:t>
             </a:fld>
             <a:endParaRPr lang="en-GB"/>
           </a:p>
@@ -2941,7 +2942,7 @@
           <a:p>
             <a:fld id="{503C1F70-F31D-4D04-896A-1B84648E6D70}" type="datetimeFigureOut">
               <a:rPr lang="en-GB" smtClean="0"/>
-              <a:t>16/06/2018</a:t>
+              <a:t>03/07/2018</a:t>
             </a:fld>
             <a:endParaRPr lang="en-GB"/>
           </a:p>
@@ -3742,6 +3743,568 @@
 </p:sld>
 </file>
 
+<file path=ppt/slides/slide2.xml><?xml version="1.0" encoding="utf-8"?>
+<p:sld xmlns:a="http://schemas.openxmlformats.org/drawingml/2006/main" xmlns:r="http://schemas.openxmlformats.org/officeDocument/2006/relationships" xmlns:p="http://schemas.openxmlformats.org/presentationml/2006/main">
+  <p:cSld>
+    <p:spTree>
+      <p:nvGrpSpPr>
+        <p:cNvPr id="1" name=""/>
+        <p:cNvGrpSpPr/>
+        <p:nvPr/>
+      </p:nvGrpSpPr>
+      <p:grpSpPr>
+        <a:xfrm>
+          <a:off x="0" y="0"/>
+          <a:ext cx="0" cy="0"/>
+          <a:chOff x="0" y="0"/>
+          <a:chExt cx="0" cy="0"/>
+        </a:xfrm>
+      </p:grpSpPr>
+      <p:sp>
+        <p:nvSpPr>
+          <p:cNvPr id="4" name="TextBox 3">
+            <a:extLst>
+              <a:ext uri="{FF2B5EF4-FFF2-40B4-BE49-F238E27FC236}">
+                <a16:creationId xmlns:a16="http://schemas.microsoft.com/office/drawing/2014/main" id="{16BD0A9C-49E3-4249-BC67-3E73CA3DF5C9}"/>
+              </a:ext>
+            </a:extLst>
+          </p:cNvPr>
+          <p:cNvSpPr txBox="1"/>
+          <p:nvPr/>
+        </p:nvSpPr>
+        <p:spPr>
+          <a:xfrm>
+            <a:off x="4959857" y="403157"/>
+            <a:ext cx="2272287" cy="307777"/>
+          </a:xfrm>
+          <a:prstGeom prst="rect">
+            <a:avLst/>
+          </a:prstGeom>
+          <a:noFill/>
+        </p:spPr>
+        <p:txBody>
+          <a:bodyPr wrap="square" rtlCol="0">
+            <a:spAutoFit/>
+          </a:bodyPr>
+          <a:lstStyle/>
+          <a:p>
+            <a:pPr algn="ctr"/>
+            <a:r>
+              <a:rPr lang="en-GB" sz="1400" b="1" dirty="0">
+                <a:solidFill>
+                  <a:srgbClr val="00B0F0"/>
+                </a:solidFill>
+              </a:rPr>
+              <a:t>J2000.0 MEAN Coordinates</a:t>
+            </a:r>
+          </a:p>
+        </p:txBody>
+      </p:sp>
+      <p:sp>
+        <p:nvSpPr>
+          <p:cNvPr id="5" name="TextBox 4">
+            <a:extLst>
+              <a:ext uri="{FF2B5EF4-FFF2-40B4-BE49-F238E27FC236}">
+                <a16:creationId xmlns:a16="http://schemas.microsoft.com/office/drawing/2014/main" id="{432040C1-CDC6-4AA1-B7FD-7453917B7A77}"/>
+              </a:ext>
+            </a:extLst>
+          </p:cNvPr>
+          <p:cNvSpPr txBox="1"/>
+          <p:nvPr/>
+        </p:nvSpPr>
+        <p:spPr>
+          <a:xfrm>
+            <a:off x="4036783" y="955535"/>
+            <a:ext cx="4118435" cy="253916"/>
+          </a:xfrm>
+          <a:prstGeom prst="rect">
+            <a:avLst/>
+          </a:prstGeom>
+          <a:noFill/>
+        </p:spPr>
+        <p:txBody>
+          <a:bodyPr wrap="square" rtlCol="0">
+            <a:spAutoFit/>
+          </a:bodyPr>
+          <a:lstStyle/>
+          <a:p>
+            <a:pPr algn="ctr"/>
+            <a:r>
+              <a:rPr lang="en-GB" sz="1050" b="1" dirty="0"/>
+              <a:t>Correct for proper motion, annual aberration, precession and nutation</a:t>
+            </a:r>
+          </a:p>
+        </p:txBody>
+      </p:sp>
+      <p:sp>
+        <p:nvSpPr>
+          <p:cNvPr id="7" name="TextBox 6">
+            <a:extLst>
+              <a:ext uri="{FF2B5EF4-FFF2-40B4-BE49-F238E27FC236}">
+                <a16:creationId xmlns:a16="http://schemas.microsoft.com/office/drawing/2014/main" id="{169D97A7-C7F9-46EA-8C1B-46DE56439C62}"/>
+              </a:ext>
+            </a:extLst>
+          </p:cNvPr>
+          <p:cNvSpPr txBox="1"/>
+          <p:nvPr/>
+        </p:nvSpPr>
+        <p:spPr>
+          <a:xfrm>
+            <a:off x="5008010" y="2504947"/>
+            <a:ext cx="2175980" cy="307777"/>
+          </a:xfrm>
+          <a:prstGeom prst="rect">
+            <a:avLst/>
+          </a:prstGeom>
+          <a:noFill/>
+        </p:spPr>
+        <p:txBody>
+          <a:bodyPr wrap="square" rtlCol="0">
+            <a:spAutoFit/>
+          </a:bodyPr>
+          <a:lstStyle/>
+          <a:p>
+            <a:pPr algn="ctr"/>
+            <a:r>
+              <a:rPr lang="en-GB" sz="1400" b="1" dirty="0">
+                <a:solidFill>
+                  <a:srgbClr val="00B0F0"/>
+                </a:solidFill>
+              </a:rPr>
+              <a:t>TOPOCENTRIC Coordinates</a:t>
+            </a:r>
+          </a:p>
+        </p:txBody>
+      </p:sp>
+      <p:sp>
+        <p:nvSpPr>
+          <p:cNvPr id="8" name="TextBox 7">
+            <a:extLst>
+              <a:ext uri="{FF2B5EF4-FFF2-40B4-BE49-F238E27FC236}">
+                <a16:creationId xmlns:a16="http://schemas.microsoft.com/office/drawing/2014/main" id="{45BC3860-CF3D-4C10-8987-57378E78BCEF}"/>
+              </a:ext>
+            </a:extLst>
+          </p:cNvPr>
+          <p:cNvSpPr txBox="1"/>
+          <p:nvPr/>
+        </p:nvSpPr>
+        <p:spPr>
+          <a:xfrm>
+            <a:off x="5410556" y="3057325"/>
+            <a:ext cx="1370888" cy="253916"/>
+          </a:xfrm>
+          <a:prstGeom prst="rect">
+            <a:avLst/>
+          </a:prstGeom>
+          <a:noFill/>
+        </p:spPr>
+        <p:txBody>
+          <a:bodyPr wrap="square" rtlCol="0">
+            <a:spAutoFit/>
+          </a:bodyPr>
+          <a:lstStyle/>
+          <a:p>
+            <a:pPr algn="ctr"/>
+            <a:r>
+              <a:rPr lang="en-GB" sz="1050" b="1" dirty="0"/>
+              <a:t>Correct for refraction</a:t>
+            </a:r>
+          </a:p>
+        </p:txBody>
+      </p:sp>
+      <p:sp>
+        <p:nvSpPr>
+          <p:cNvPr id="9" name="TextBox 8">
+            <a:extLst>
+              <a:ext uri="{FF2B5EF4-FFF2-40B4-BE49-F238E27FC236}">
+                <a16:creationId xmlns:a16="http://schemas.microsoft.com/office/drawing/2014/main" id="{98A19262-7813-45FA-8EC2-C8208F0764F9}"/>
+              </a:ext>
+            </a:extLst>
+          </p:cNvPr>
+          <p:cNvSpPr txBox="1"/>
+          <p:nvPr/>
+        </p:nvSpPr>
+        <p:spPr>
+          <a:xfrm>
+            <a:off x="5134936" y="3578925"/>
+            <a:ext cx="1922129" cy="307777"/>
+          </a:xfrm>
+          <a:prstGeom prst="rect">
+            <a:avLst/>
+          </a:prstGeom>
+          <a:noFill/>
+        </p:spPr>
+        <p:txBody>
+          <a:bodyPr wrap="square" rtlCol="0">
+            <a:spAutoFit/>
+          </a:bodyPr>
+          <a:lstStyle/>
+          <a:p>
+            <a:pPr algn="ctr"/>
+            <a:r>
+              <a:rPr lang="en-GB" sz="1400" b="1" dirty="0">
+                <a:solidFill>
+                  <a:srgbClr val="00B0F0"/>
+                </a:solidFill>
+              </a:rPr>
+              <a:t>OBSERVED Coordinates</a:t>
+            </a:r>
+          </a:p>
+        </p:txBody>
+      </p:sp>
+      <p:cxnSp>
+        <p:nvCxnSpPr>
+          <p:cNvPr id="11" name="Straight Arrow Connector 10">
+            <a:extLst>
+              <a:ext uri="{FF2B5EF4-FFF2-40B4-BE49-F238E27FC236}">
+                <a16:creationId xmlns:a16="http://schemas.microsoft.com/office/drawing/2014/main" id="{975AA1EF-9052-43DA-8389-B155ABE7FFCA}"/>
+              </a:ext>
+            </a:extLst>
+          </p:cNvPr>
+          <p:cNvCxnSpPr>
+            <a:cxnSpLocks/>
+          </p:cNvCxnSpPr>
+          <p:nvPr/>
+        </p:nvCxnSpPr>
+        <p:spPr>
+          <a:xfrm>
+            <a:off x="6096000" y="710934"/>
+            <a:ext cx="1" cy="244601"/>
+          </a:xfrm>
+          <a:prstGeom prst="straightConnector1">
+            <a:avLst/>
+          </a:prstGeom>
+          <a:ln w="19050">
+            <a:solidFill>
+              <a:srgbClr val="FF0000"/>
+            </a:solidFill>
+            <a:tailEnd type="stealth" w="med" len="med"/>
+          </a:ln>
+        </p:spPr>
+        <p:style>
+          <a:lnRef idx="1">
+            <a:schemeClr val="accent1"/>
+          </a:lnRef>
+          <a:fillRef idx="0">
+            <a:schemeClr val="accent1"/>
+          </a:fillRef>
+          <a:effectRef idx="0">
+            <a:schemeClr val="accent1"/>
+          </a:effectRef>
+          <a:fontRef idx="minor">
+            <a:schemeClr val="tx1"/>
+          </a:fontRef>
+        </p:style>
+      </p:cxnSp>
+      <p:cxnSp>
+        <p:nvCxnSpPr>
+          <p:cNvPr id="15" name="Straight Arrow Connector 14">
+            <a:extLst>
+              <a:ext uri="{FF2B5EF4-FFF2-40B4-BE49-F238E27FC236}">
+                <a16:creationId xmlns:a16="http://schemas.microsoft.com/office/drawing/2014/main" id="{E66539F0-6003-42A9-8295-53DF4D027B2A}"/>
+              </a:ext>
+            </a:extLst>
+          </p:cNvPr>
+          <p:cNvCxnSpPr>
+            <a:cxnSpLocks/>
+          </p:cNvCxnSpPr>
+          <p:nvPr/>
+        </p:nvCxnSpPr>
+        <p:spPr>
+          <a:xfrm>
+            <a:off x="6096000" y="2812724"/>
+            <a:ext cx="0" cy="244601"/>
+          </a:xfrm>
+          <a:prstGeom prst="straightConnector1">
+            <a:avLst/>
+          </a:prstGeom>
+          <a:ln w="19050">
+            <a:solidFill>
+              <a:srgbClr val="FF0000"/>
+            </a:solidFill>
+            <a:tailEnd type="stealth" w="med" len="med"/>
+          </a:ln>
+        </p:spPr>
+        <p:style>
+          <a:lnRef idx="1">
+            <a:schemeClr val="accent1"/>
+          </a:lnRef>
+          <a:fillRef idx="0">
+            <a:schemeClr val="accent1"/>
+          </a:fillRef>
+          <a:effectRef idx="0">
+            <a:schemeClr val="accent1"/>
+          </a:effectRef>
+          <a:fontRef idx="minor">
+            <a:schemeClr val="tx1"/>
+          </a:fontRef>
+        </p:style>
+      </p:cxnSp>
+      <p:cxnSp>
+        <p:nvCxnSpPr>
+          <p:cNvPr id="16" name="Straight Arrow Connector 15">
+            <a:extLst>
+              <a:ext uri="{FF2B5EF4-FFF2-40B4-BE49-F238E27FC236}">
+                <a16:creationId xmlns:a16="http://schemas.microsoft.com/office/drawing/2014/main" id="{227F7480-6049-49E3-9475-E693DF8EC2CB}"/>
+              </a:ext>
+            </a:extLst>
+          </p:cNvPr>
+          <p:cNvCxnSpPr>
+            <a:cxnSpLocks/>
+          </p:cNvCxnSpPr>
+          <p:nvPr/>
+        </p:nvCxnSpPr>
+        <p:spPr>
+          <a:xfrm>
+            <a:off x="6096000" y="3311241"/>
+            <a:ext cx="1" cy="267684"/>
+          </a:xfrm>
+          <a:prstGeom prst="straightConnector1">
+            <a:avLst/>
+          </a:prstGeom>
+          <a:ln w="19050">
+            <a:solidFill>
+              <a:srgbClr val="FF0000"/>
+            </a:solidFill>
+            <a:tailEnd type="stealth" w="med" len="med"/>
+          </a:ln>
+        </p:spPr>
+        <p:style>
+          <a:lnRef idx="1">
+            <a:schemeClr val="accent1"/>
+          </a:lnRef>
+          <a:fillRef idx="0">
+            <a:schemeClr val="accent1"/>
+          </a:fillRef>
+          <a:effectRef idx="0">
+            <a:schemeClr val="accent1"/>
+          </a:effectRef>
+          <a:fontRef idx="minor">
+            <a:schemeClr val="tx1"/>
+          </a:fontRef>
+        </p:style>
+      </p:cxnSp>
+      <p:sp>
+        <p:nvSpPr>
+          <p:cNvPr id="12" name="TextBox 11">
+            <a:extLst>
+              <a:ext uri="{FF2B5EF4-FFF2-40B4-BE49-F238E27FC236}">
+                <a16:creationId xmlns:a16="http://schemas.microsoft.com/office/drawing/2014/main" id="{2053129A-FBD9-4EDF-B4DF-BC177BC656AF}"/>
+              </a:ext>
+            </a:extLst>
+          </p:cNvPr>
+          <p:cNvSpPr txBox="1"/>
+          <p:nvPr/>
+        </p:nvSpPr>
+        <p:spPr>
+          <a:xfrm>
+            <a:off x="5139136" y="1454052"/>
+            <a:ext cx="1913729" cy="307777"/>
+          </a:xfrm>
+          <a:prstGeom prst="rect">
+            <a:avLst/>
+          </a:prstGeom>
+          <a:noFill/>
+        </p:spPr>
+        <p:txBody>
+          <a:bodyPr wrap="square" rtlCol="0">
+            <a:spAutoFit/>
+          </a:bodyPr>
+          <a:lstStyle/>
+          <a:p>
+            <a:pPr algn="ctr"/>
+            <a:r>
+              <a:rPr lang="en-GB" sz="1400" b="1" dirty="0">
+                <a:solidFill>
+                  <a:srgbClr val="00B0F0"/>
+                </a:solidFill>
+              </a:rPr>
+              <a:t>APPARENT Coordinates</a:t>
+            </a:r>
+          </a:p>
+        </p:txBody>
+      </p:sp>
+      <p:sp>
+        <p:nvSpPr>
+          <p:cNvPr id="13" name="TextBox 12">
+            <a:extLst>
+              <a:ext uri="{FF2B5EF4-FFF2-40B4-BE49-F238E27FC236}">
+                <a16:creationId xmlns:a16="http://schemas.microsoft.com/office/drawing/2014/main" id="{1F2C4579-2AAD-4E43-9CFC-110C8A19CE21}"/>
+              </a:ext>
+            </a:extLst>
+          </p:cNvPr>
+          <p:cNvSpPr txBox="1"/>
+          <p:nvPr/>
+        </p:nvSpPr>
+        <p:spPr>
+          <a:xfrm>
+            <a:off x="5177319" y="2006430"/>
+            <a:ext cx="1837362" cy="253916"/>
+          </a:xfrm>
+          <a:prstGeom prst="rect">
+            <a:avLst/>
+          </a:prstGeom>
+          <a:noFill/>
+        </p:spPr>
+        <p:txBody>
+          <a:bodyPr wrap="square" rtlCol="0">
+            <a:spAutoFit/>
+          </a:bodyPr>
+          <a:lstStyle/>
+          <a:p>
+            <a:pPr algn="ctr"/>
+            <a:r>
+              <a:rPr lang="en-GB" sz="1050" b="1" dirty="0"/>
+              <a:t>Correct for diurnal aberration</a:t>
+            </a:r>
+          </a:p>
+        </p:txBody>
+      </p:sp>
+      <p:cxnSp>
+        <p:nvCxnSpPr>
+          <p:cNvPr id="17" name="Straight Arrow Connector 16">
+            <a:extLst>
+              <a:ext uri="{FF2B5EF4-FFF2-40B4-BE49-F238E27FC236}">
+                <a16:creationId xmlns:a16="http://schemas.microsoft.com/office/drawing/2014/main" id="{82D6BEE0-8130-42D6-95AD-09895CFB3A44}"/>
+              </a:ext>
+            </a:extLst>
+          </p:cNvPr>
+          <p:cNvCxnSpPr>
+            <a:cxnSpLocks/>
+          </p:cNvCxnSpPr>
+          <p:nvPr/>
+        </p:nvCxnSpPr>
+        <p:spPr>
+          <a:xfrm flipH="1">
+            <a:off x="6096000" y="1761829"/>
+            <a:ext cx="1" cy="244601"/>
+          </a:xfrm>
+          <a:prstGeom prst="straightConnector1">
+            <a:avLst/>
+          </a:prstGeom>
+          <a:ln w="19050">
+            <a:solidFill>
+              <a:srgbClr val="FF0000"/>
+            </a:solidFill>
+            <a:tailEnd type="stealth" w="med" len="med"/>
+          </a:ln>
+        </p:spPr>
+        <p:style>
+          <a:lnRef idx="1">
+            <a:schemeClr val="accent1"/>
+          </a:lnRef>
+          <a:fillRef idx="0">
+            <a:schemeClr val="accent1"/>
+          </a:fillRef>
+          <a:effectRef idx="0">
+            <a:schemeClr val="accent1"/>
+          </a:effectRef>
+          <a:fontRef idx="minor">
+            <a:schemeClr val="tx1"/>
+          </a:fontRef>
+        </p:style>
+      </p:cxnSp>
+      <p:cxnSp>
+        <p:nvCxnSpPr>
+          <p:cNvPr id="18" name="Straight Arrow Connector 17">
+            <a:extLst>
+              <a:ext uri="{FF2B5EF4-FFF2-40B4-BE49-F238E27FC236}">
+                <a16:creationId xmlns:a16="http://schemas.microsoft.com/office/drawing/2014/main" id="{84890987-FBB3-43A8-96DE-E7D829CC1153}"/>
+              </a:ext>
+            </a:extLst>
+          </p:cNvPr>
+          <p:cNvCxnSpPr>
+            <a:cxnSpLocks/>
+          </p:cNvCxnSpPr>
+          <p:nvPr/>
+        </p:nvCxnSpPr>
+        <p:spPr>
+          <a:xfrm flipH="1">
+            <a:off x="6095200" y="1209451"/>
+            <a:ext cx="1601" cy="244601"/>
+          </a:xfrm>
+          <a:prstGeom prst="straightConnector1">
+            <a:avLst/>
+          </a:prstGeom>
+          <a:ln w="19050">
+            <a:solidFill>
+              <a:srgbClr val="FF0000"/>
+            </a:solidFill>
+            <a:tailEnd type="stealth" w="med" len="med"/>
+          </a:ln>
+        </p:spPr>
+        <p:style>
+          <a:lnRef idx="1">
+            <a:schemeClr val="accent1"/>
+          </a:lnRef>
+          <a:fillRef idx="0">
+            <a:schemeClr val="accent1"/>
+          </a:fillRef>
+          <a:effectRef idx="0">
+            <a:schemeClr val="accent1"/>
+          </a:effectRef>
+          <a:fontRef idx="minor">
+            <a:schemeClr val="tx1"/>
+          </a:fontRef>
+        </p:style>
+      </p:cxnSp>
+      <p:cxnSp>
+        <p:nvCxnSpPr>
+          <p:cNvPr id="19" name="Straight Arrow Connector 18">
+            <a:extLst>
+              <a:ext uri="{FF2B5EF4-FFF2-40B4-BE49-F238E27FC236}">
+                <a16:creationId xmlns:a16="http://schemas.microsoft.com/office/drawing/2014/main" id="{15F57710-5C24-4C32-819B-04C8BFC51D27}"/>
+              </a:ext>
+            </a:extLst>
+          </p:cNvPr>
+          <p:cNvCxnSpPr>
+            <a:cxnSpLocks/>
+          </p:cNvCxnSpPr>
+          <p:nvPr/>
+        </p:nvCxnSpPr>
+        <p:spPr>
+          <a:xfrm flipH="1">
+            <a:off x="6096000" y="2260346"/>
+            <a:ext cx="1" cy="244601"/>
+          </a:xfrm>
+          <a:prstGeom prst="straightConnector1">
+            <a:avLst/>
+          </a:prstGeom>
+          <a:ln w="19050">
+            <a:solidFill>
+              <a:srgbClr val="FF0000"/>
+            </a:solidFill>
+            <a:tailEnd type="stealth" w="med" len="med"/>
+          </a:ln>
+        </p:spPr>
+        <p:style>
+          <a:lnRef idx="1">
+            <a:schemeClr val="accent1"/>
+          </a:lnRef>
+          <a:fillRef idx="0">
+            <a:schemeClr val="accent1"/>
+          </a:fillRef>
+          <a:effectRef idx="0">
+            <a:schemeClr val="accent1"/>
+          </a:effectRef>
+          <a:fontRef idx="minor">
+            <a:schemeClr val="tx1"/>
+          </a:fontRef>
+        </p:style>
+      </p:cxnSp>
+    </p:spTree>
+    <p:extLst>
+      <p:ext uri="{BB962C8B-B14F-4D97-AF65-F5344CB8AC3E}">
+        <p14:creationId xmlns:p14="http://schemas.microsoft.com/office/powerpoint/2010/main" val="1117644899"/>
+      </p:ext>
+    </p:extLst>
+  </p:cSld>
+  <p:clrMapOvr>
+    <a:masterClrMapping/>
+  </p:clrMapOvr>
+</p:sld>
+</file>
+
 <file path=ppt/theme/theme1.xml><?xml version="1.0" encoding="utf-8"?>
 <a:theme xmlns:a="http://schemas.openxmlformats.org/drawingml/2006/main" name="Office Theme">
   <a:themeElements>

</xml_diff>